<commit_message>
Little update and release number two
</commit_message>
<xml_diff>
--- a/Resonant_Frequencies_WS1/Resonant Frequencies WS1.pptx
+++ b/Resonant_Frequencies_WS1/Resonant Frequencies WS1.pptx
@@ -425,7 +425,7 @@
           <a:p>
             <a:fld id="{300EF211-2BFB-6B4A-8ED9-E264860AF635}" type="datetimeFigureOut">
               <a:rPr lang="nl-NL" smtClean="0"/>
-              <a:t>25-11-2025</a:t>
+              <a:t>26-11-2025</a:t>
             </a:fld>
             <a:endParaRPr lang="nl-NL"/>
           </a:p>
@@ -467,7 +467,7 @@
           <a:p>
             <a:fld id="{D5E111BD-0E9D-6447-BCC7-BAE87DDFF598}" type="slidenum">
               <a:rPr lang="nl-NL" smtClean="0"/>
-              <a:t>‹nr.›</a:t>
+              <a:t>‹#›</a:t>
             </a:fld>
             <a:endParaRPr lang="nl-NL"/>
           </a:p>
@@ -595,7 +595,7 @@
           <a:p>
             <a:fld id="{300EF211-2BFB-6B4A-8ED9-E264860AF635}" type="datetimeFigureOut">
               <a:rPr lang="nl-NL" smtClean="0"/>
-              <a:t>25-11-2025</a:t>
+              <a:t>26-11-2025</a:t>
             </a:fld>
             <a:endParaRPr lang="nl-NL"/>
           </a:p>
@@ -637,7 +637,7 @@
           <a:p>
             <a:fld id="{D5E111BD-0E9D-6447-BCC7-BAE87DDFF598}" type="slidenum">
               <a:rPr lang="nl-NL" smtClean="0"/>
-              <a:t>‹nr.›</a:t>
+              <a:t>‹#›</a:t>
             </a:fld>
             <a:endParaRPr lang="nl-NL"/>
           </a:p>
@@ -775,7 +775,7 @@
           <a:p>
             <a:fld id="{300EF211-2BFB-6B4A-8ED9-E264860AF635}" type="datetimeFigureOut">
               <a:rPr lang="nl-NL" smtClean="0"/>
-              <a:t>25-11-2025</a:t>
+              <a:t>26-11-2025</a:t>
             </a:fld>
             <a:endParaRPr lang="nl-NL"/>
           </a:p>
@@ -817,7 +817,7 @@
           <a:p>
             <a:fld id="{D5E111BD-0E9D-6447-BCC7-BAE87DDFF598}" type="slidenum">
               <a:rPr lang="nl-NL" smtClean="0"/>
-              <a:t>‹nr.›</a:t>
+              <a:t>‹#›</a:t>
             </a:fld>
             <a:endParaRPr lang="nl-NL"/>
           </a:p>
@@ -945,7 +945,7 @@
           <a:p>
             <a:fld id="{300EF211-2BFB-6B4A-8ED9-E264860AF635}" type="datetimeFigureOut">
               <a:rPr lang="nl-NL" smtClean="0"/>
-              <a:t>25-11-2025</a:t>
+              <a:t>26-11-2025</a:t>
             </a:fld>
             <a:endParaRPr lang="nl-NL"/>
           </a:p>
@@ -987,7 +987,7 @@
           <a:p>
             <a:fld id="{D5E111BD-0E9D-6447-BCC7-BAE87DDFF598}" type="slidenum">
               <a:rPr lang="nl-NL" smtClean="0"/>
-              <a:t>‹nr.›</a:t>
+              <a:t>‹#›</a:t>
             </a:fld>
             <a:endParaRPr lang="nl-NL"/>
           </a:p>
@@ -1191,7 +1191,7 @@
           <a:p>
             <a:fld id="{300EF211-2BFB-6B4A-8ED9-E264860AF635}" type="datetimeFigureOut">
               <a:rPr lang="nl-NL" smtClean="0"/>
-              <a:t>25-11-2025</a:t>
+              <a:t>26-11-2025</a:t>
             </a:fld>
             <a:endParaRPr lang="nl-NL"/>
           </a:p>
@@ -1233,7 +1233,7 @@
           <a:p>
             <a:fld id="{D5E111BD-0E9D-6447-BCC7-BAE87DDFF598}" type="slidenum">
               <a:rPr lang="nl-NL" smtClean="0"/>
-              <a:t>‹nr.›</a:t>
+              <a:t>‹#›</a:t>
             </a:fld>
             <a:endParaRPr lang="nl-NL"/>
           </a:p>
@@ -1423,7 +1423,7 @@
           <a:p>
             <a:fld id="{300EF211-2BFB-6B4A-8ED9-E264860AF635}" type="datetimeFigureOut">
               <a:rPr lang="nl-NL" smtClean="0"/>
-              <a:t>25-11-2025</a:t>
+              <a:t>26-11-2025</a:t>
             </a:fld>
             <a:endParaRPr lang="nl-NL"/>
           </a:p>
@@ -1465,7 +1465,7 @@
           <a:p>
             <a:fld id="{D5E111BD-0E9D-6447-BCC7-BAE87DDFF598}" type="slidenum">
               <a:rPr lang="nl-NL" smtClean="0"/>
-              <a:t>‹nr.›</a:t>
+              <a:t>‹#›</a:t>
             </a:fld>
             <a:endParaRPr lang="nl-NL"/>
           </a:p>
@@ -1790,7 +1790,7 @@
           <a:p>
             <a:fld id="{300EF211-2BFB-6B4A-8ED9-E264860AF635}" type="datetimeFigureOut">
               <a:rPr lang="nl-NL" smtClean="0"/>
-              <a:t>25-11-2025</a:t>
+              <a:t>26-11-2025</a:t>
             </a:fld>
             <a:endParaRPr lang="nl-NL"/>
           </a:p>
@@ -1832,7 +1832,7 @@
           <a:p>
             <a:fld id="{D5E111BD-0E9D-6447-BCC7-BAE87DDFF598}" type="slidenum">
               <a:rPr lang="nl-NL" smtClean="0"/>
-              <a:t>‹nr.›</a:t>
+              <a:t>‹#›</a:t>
             </a:fld>
             <a:endParaRPr lang="nl-NL"/>
           </a:p>
@@ -1908,7 +1908,7 @@
           <a:p>
             <a:fld id="{300EF211-2BFB-6B4A-8ED9-E264860AF635}" type="datetimeFigureOut">
               <a:rPr lang="nl-NL" smtClean="0"/>
-              <a:t>25-11-2025</a:t>
+              <a:t>26-11-2025</a:t>
             </a:fld>
             <a:endParaRPr lang="nl-NL"/>
           </a:p>
@@ -1950,7 +1950,7 @@
           <a:p>
             <a:fld id="{D5E111BD-0E9D-6447-BCC7-BAE87DDFF598}" type="slidenum">
               <a:rPr lang="nl-NL" smtClean="0"/>
-              <a:t>‹nr.›</a:t>
+              <a:t>‹#›</a:t>
             </a:fld>
             <a:endParaRPr lang="nl-NL"/>
           </a:p>
@@ -2003,7 +2003,7 @@
           <a:p>
             <a:fld id="{300EF211-2BFB-6B4A-8ED9-E264860AF635}" type="datetimeFigureOut">
               <a:rPr lang="nl-NL" smtClean="0"/>
-              <a:t>25-11-2025</a:t>
+              <a:t>26-11-2025</a:t>
             </a:fld>
             <a:endParaRPr lang="nl-NL"/>
           </a:p>
@@ -2045,7 +2045,7 @@
           <a:p>
             <a:fld id="{D5E111BD-0E9D-6447-BCC7-BAE87DDFF598}" type="slidenum">
               <a:rPr lang="nl-NL" smtClean="0"/>
-              <a:t>‹nr.›</a:t>
+              <a:t>‹#›</a:t>
             </a:fld>
             <a:endParaRPr lang="nl-NL"/>
           </a:p>
@@ -2280,7 +2280,7 @@
           <a:p>
             <a:fld id="{300EF211-2BFB-6B4A-8ED9-E264860AF635}" type="datetimeFigureOut">
               <a:rPr lang="nl-NL" smtClean="0"/>
-              <a:t>25-11-2025</a:t>
+              <a:t>26-11-2025</a:t>
             </a:fld>
             <a:endParaRPr lang="nl-NL"/>
           </a:p>
@@ -2322,7 +2322,7 @@
           <a:p>
             <a:fld id="{D5E111BD-0E9D-6447-BCC7-BAE87DDFF598}" type="slidenum">
               <a:rPr lang="nl-NL" smtClean="0"/>
-              <a:t>‹nr.›</a:t>
+              <a:t>‹#›</a:t>
             </a:fld>
             <a:endParaRPr lang="nl-NL"/>
           </a:p>
@@ -2537,7 +2537,7 @@
           <a:p>
             <a:fld id="{300EF211-2BFB-6B4A-8ED9-E264860AF635}" type="datetimeFigureOut">
               <a:rPr lang="nl-NL" smtClean="0"/>
-              <a:t>25-11-2025</a:t>
+              <a:t>26-11-2025</a:t>
             </a:fld>
             <a:endParaRPr lang="nl-NL"/>
           </a:p>
@@ -2579,7 +2579,7 @@
           <a:p>
             <a:fld id="{D5E111BD-0E9D-6447-BCC7-BAE87DDFF598}" type="slidenum">
               <a:rPr lang="nl-NL" smtClean="0"/>
-              <a:t>‹nr.›</a:t>
+              <a:t>‹#›</a:t>
             </a:fld>
             <a:endParaRPr lang="nl-NL"/>
           </a:p>
@@ -2750,7 +2750,7 @@
           <a:p>
             <a:fld id="{300EF211-2BFB-6B4A-8ED9-E264860AF635}" type="datetimeFigureOut">
               <a:rPr lang="nl-NL" smtClean="0"/>
-              <a:t>25-11-2025</a:t>
+              <a:t>26-11-2025</a:t>
             </a:fld>
             <a:endParaRPr lang="nl-NL"/>
           </a:p>
@@ -2828,7 +2828,7 @@
           <a:p>
             <a:fld id="{D5E111BD-0E9D-6447-BCC7-BAE87DDFF598}" type="slidenum">
               <a:rPr lang="nl-NL" smtClean="0"/>
-              <a:t>‹nr.›</a:t>
+              <a:t>‹#›</a:t>
             </a:fld>
             <a:endParaRPr lang="nl-NL"/>
           </a:p>
@@ -7614,7 +7614,7 @@
         </p:nvSpPr>
         <p:spPr>
           <a:xfrm>
-            <a:off x="1099447" y="1332102"/>
+            <a:off x="197753" y="856944"/>
             <a:ext cx="5304529" cy="646331"/>
           </a:xfrm>
           <a:prstGeom prst="rect">
@@ -7713,7 +7713,7 @@
         </p:nvSpPr>
         <p:spPr>
           <a:xfrm>
-            <a:off x="1051507" y="2371621"/>
+            <a:off x="149813" y="1896463"/>
             <a:ext cx="4949817" cy="646331"/>
           </a:xfrm>
           <a:prstGeom prst="rect">
@@ -7803,7 +7803,7 @@
         </p:nvSpPr>
         <p:spPr>
           <a:xfrm>
-            <a:off x="1051507" y="3394782"/>
+            <a:off x="149813" y="2919624"/>
             <a:ext cx="6212278" cy="646331"/>
           </a:xfrm>
           <a:prstGeom prst="rect">
@@ -7900,7 +7900,7 @@
         </p:nvSpPr>
         <p:spPr>
           <a:xfrm>
-            <a:off x="1097041" y="4417943"/>
+            <a:off x="195347" y="3942785"/>
             <a:ext cx="5440785" cy="646331"/>
           </a:xfrm>
           <a:prstGeom prst="rect">
@@ -7989,8 +7989,8 @@
         </p:nvSpPr>
         <p:spPr>
           <a:xfrm>
-            <a:off x="3725839" y="5923128"/>
-            <a:ext cx="4935005" cy="369332"/>
+            <a:off x="179400" y="4797638"/>
+            <a:ext cx="11765016" cy="646331"/>
           </a:xfrm>
           <a:prstGeom prst="rect">
             <a:avLst/>
@@ -8029,7 +8029,113 @@
             </a:r>
             <a:r>
               <a:rPr lang="nl-NL" dirty="0"/>
-              <a:t> open ‘Blink’</a:t>
+              <a:t> open ‘1-Basic_Blink.ino’</a:t>
+            </a:r>
+          </a:p>
+          <a:p>
+            <a:r>
+              <a:rPr lang="nl-NL" dirty="0" err="1"/>
+              <a:t>https</a:t>
+            </a:r>
+            <a:r>
+              <a:rPr lang="nl-NL" dirty="0"/>
+              <a:t>://</a:t>
+            </a:r>
+            <a:r>
+              <a:rPr lang="nl-NL" dirty="0" err="1"/>
+              <a:t>github.com</a:t>
+            </a:r>
+            <a:r>
+              <a:rPr lang="nl-NL" dirty="0"/>
+              <a:t>/ichingxs4all/Midi-</a:t>
+            </a:r>
+            <a:r>
+              <a:rPr lang="nl-NL" dirty="0" err="1"/>
+              <a:t>MusicVilla</a:t>
+            </a:r>
+            <a:r>
+              <a:rPr lang="nl-NL" dirty="0"/>
+              <a:t>/releases/download/Resonant_Frequencies_WS2/Midi-</a:t>
+            </a:r>
+            <a:r>
+              <a:rPr lang="nl-NL" dirty="0" err="1"/>
+              <a:t>MusicVilla.zip</a:t>
+            </a:r>
+            <a:endParaRPr lang="nl-NL" dirty="0"/>
+          </a:p>
+        </p:txBody>
+      </p:sp>
+      <p:sp>
+        <p:nvSpPr>
+          <p:cNvPr id="5" name="Tekstvak 8">
+            <a:extLst>
+              <a:ext uri="{FF2B5EF4-FFF2-40B4-BE49-F238E27FC236}">
+                <a16:creationId xmlns:a16="http://schemas.microsoft.com/office/drawing/2014/main" id="{D8C68DDF-1DE0-6465-7F73-3B7F52A11922}"/>
+              </a:ext>
+            </a:extLst>
+          </p:cNvPr>
+          <p:cNvSpPr txBox="1"/>
+          <p:nvPr/>
+        </p:nvSpPr>
+        <p:spPr>
+          <a:xfrm>
+            <a:off x="179400" y="5662114"/>
+            <a:ext cx="6839821" cy="369332"/>
+          </a:xfrm>
+          <a:prstGeom prst="rect">
+            <a:avLst/>
+          </a:prstGeom>
+          <a:noFill/>
+        </p:spPr>
+        <p:txBody>
+          <a:bodyPr wrap="none" rtlCol="0">
+            <a:spAutoFit/>
+          </a:bodyPr>
+          <a:lstStyle/>
+          <a:p>
+            <a:r>
+              <a:rPr lang="nl-NL" dirty="0"/>
+              <a:t>Step 6: </a:t>
+            </a:r>
+            <a:r>
+              <a:rPr lang="nl-NL" dirty="0" err="1"/>
+              <a:t>Try</a:t>
+            </a:r>
+            <a:r>
+              <a:rPr lang="nl-NL" dirty="0"/>
+              <a:t> </a:t>
+            </a:r>
+            <a:r>
+              <a:rPr lang="nl-NL" dirty="0" err="1"/>
+              <a:t>to</a:t>
+            </a:r>
+            <a:r>
+              <a:rPr lang="nl-NL" dirty="0"/>
+              <a:t> Upload </a:t>
+            </a:r>
+            <a:r>
+              <a:rPr lang="nl-NL" dirty="0" err="1"/>
+              <a:t>the</a:t>
+            </a:r>
+            <a:r>
+              <a:rPr lang="nl-NL" dirty="0"/>
+              <a:t> Sketch </a:t>
+            </a:r>
+            <a:r>
+              <a:rPr lang="nl-NL" dirty="0" err="1"/>
+              <a:t>by</a:t>
+            </a:r>
+            <a:r>
+              <a:rPr lang="nl-NL" dirty="0"/>
+              <a:t> pressing </a:t>
+            </a:r>
+            <a:r>
+              <a:rPr lang="nl-NL" dirty="0" err="1"/>
+              <a:t>the</a:t>
+            </a:r>
+            <a:r>
+              <a:rPr lang="nl-NL" dirty="0"/>
+              <a:t> ‘Arrow Right’ button</a:t>
             </a:r>
           </a:p>
         </p:txBody>

</xml_diff>